<commit_message>
Updates to Review Images, Added Streptophyta Heatplot
</commit_message>
<xml_diff>
--- a/Images/Figures_PPT/AlvRhizHeatPlotMetaPlot.pptx
+++ b/Images/Figures_PPT/AlvRhizHeatPlotMetaPlot.pptx
@@ -55206,7 +55206,7 @@
               <a:avLst/>
             </a:prstGeom>
             <a:solidFill>
-              <a:srgbClr val="3CBA26">
+              <a:srgbClr val="A020F0">
                 <a:alpha val="100000"/>
               </a:srgbClr>
             </a:solidFill>
@@ -55241,7 +55241,7 @@
               <a:avLst/>
             </a:prstGeom>
             <a:solidFill>
-              <a:srgbClr val="3CBA26">
+              <a:srgbClr val="A020F0">
                 <a:alpha val="100000"/>
               </a:srgbClr>
             </a:solidFill>
@@ -55311,7 +55311,7 @@
               <a:avLst/>
             </a:prstGeom>
             <a:solidFill>
-              <a:srgbClr val="3CBA26">
+              <a:srgbClr val="A020F0">
                 <a:alpha val="100000"/>
               </a:srgbClr>
             </a:solidFill>

</xml_diff>